<commit_message>
ajuste dos dados do ppt
após correção do filtro de outliers
</commit_message>
<xml_diff>
--- a/Analise de Vendas Farmaceuticas.pptx
+++ b/Analise de Vendas Farmaceuticas.pptx
@@ -6923,14 +6923,14 @@
           <p:nvPr>
             <p:extLst>
               <p:ext uri="{D42A27DB-BD31-4B8C-83A1-F6EECF244321}">
-                <p14:modId xmlns:p14="http://schemas.microsoft.com/office/powerpoint/2010/main" val="2869197866"/>
+                <p14:modId xmlns:p14="http://schemas.microsoft.com/office/powerpoint/2010/main" val="1431135000"/>
               </p:ext>
             </p:extLst>
           </p:nvPr>
         </p:nvGraphicFramePr>
         <p:xfrm>
           <a:off x="6591299" y="1551920"/>
-          <a:ext cx="5245101" cy="1255395"/>
+          <a:ext cx="5245101" cy="1323975"/>
         </p:xfrm>
         <a:graphic>
           <a:graphicData uri="http://schemas.openxmlformats.org/drawingml/2006/table">
@@ -7246,12 +7246,8 @@
                     <a:p>
                       <a:pPr algn="ctr" fontAlgn="b"/>
                       <a:r>
-                        <a:rPr lang="pt-BR" sz="1300" u="none" strike="noStrike" dirty="0">
-                          <a:effectLst/>
-                          <a:latin typeface="Arial" panose="020B0604020202020204" pitchFamily="34" charset="0"/>
-                          <a:cs typeface="Arial" panose="020B0604020202020204" pitchFamily="34" charset="0"/>
-                        </a:rPr>
-                        <a:t>4827</a:t>
+                        <a:rPr lang="pt-BR" sz="1400" dirty="0" smtClean="0"/>
+                        <a:t>381</a:t>
                       </a:r>
                       <a:endParaRPr lang="pt-BR" sz="1300" b="0" i="0" u="none" strike="noStrike" dirty="0">
                         <a:solidFill>
@@ -7442,12 +7438,8 @@
                     <a:p>
                       <a:pPr algn="ctr" fontAlgn="b"/>
                       <a:r>
-                        <a:rPr lang="pt-BR" sz="1300" u="none" strike="noStrike" dirty="0">
-                          <a:effectLst/>
-                          <a:latin typeface="Arial" panose="020B0604020202020204" pitchFamily="34" charset="0"/>
-                          <a:cs typeface="Arial" panose="020B0604020202020204" pitchFamily="34" charset="0"/>
-                        </a:rPr>
-                        <a:t>2774250</a:t>
+                        <a:rPr lang="pt-BR" sz="1400" dirty="0" smtClean="0"/>
+                        <a:t>199796</a:t>
                       </a:r>
                       <a:endParaRPr lang="pt-BR" sz="1300" b="0" i="0" u="none" strike="noStrike" dirty="0">
                         <a:solidFill>
@@ -7638,12 +7630,8 @@
                     <a:p>
                       <a:pPr algn="ctr" fontAlgn="b"/>
                       <a:r>
-                        <a:rPr lang="pt-BR" sz="1300" u="none" strike="noStrike" dirty="0">
-                          <a:effectLst/>
-                          <a:latin typeface="Arial" panose="020B0604020202020204" pitchFamily="34" charset="0"/>
-                          <a:cs typeface="Arial" panose="020B0604020202020204" pitchFamily="34" charset="0"/>
-                        </a:rPr>
-                        <a:t>995525</a:t>
+                        <a:rPr lang="pt-BR" sz="1400" dirty="0" smtClean="0"/>
+                        <a:t>68884</a:t>
                       </a:r>
                       <a:endParaRPr lang="pt-BR" sz="1300" b="0" i="0" u="none" strike="noStrike" dirty="0">
                         <a:solidFill>
@@ -7834,12 +7822,8 @@
                     <a:p>
                       <a:pPr algn="ctr" fontAlgn="b"/>
                       <a:r>
-                        <a:rPr lang="pt-BR" sz="1300" u="none" strike="noStrike" dirty="0">
-                          <a:effectLst/>
-                          <a:latin typeface="Arial" panose="020B0604020202020204" pitchFamily="34" charset="0"/>
-                          <a:cs typeface="Arial" panose="020B0604020202020204" pitchFamily="34" charset="0"/>
-                        </a:rPr>
-                        <a:t>995525</a:t>
+                        <a:rPr lang="pt-BR" sz="1400" dirty="0" smtClean="0"/>
+                        <a:t>68884</a:t>
                       </a:r>
                       <a:endParaRPr lang="pt-BR" sz="1300" b="0" i="0" u="none" strike="noStrike" dirty="0">
                         <a:solidFill>
@@ -8030,12 +8014,8 @@
                     <a:p>
                       <a:pPr algn="ctr" fontAlgn="b"/>
                       <a:r>
-                        <a:rPr lang="pt-BR" sz="1300" u="none" strike="noStrike" dirty="0">
-                          <a:effectLst/>
-                          <a:latin typeface="Arial" panose="020B0604020202020204" pitchFamily="34" charset="0"/>
-                          <a:cs typeface="Arial" panose="020B0604020202020204" pitchFamily="34" charset="0"/>
-                        </a:rPr>
-                        <a:t>995525</a:t>
+                        <a:rPr lang="pt-BR" sz="1400" dirty="0" smtClean="0"/>
+                        <a:t>68884</a:t>
                       </a:r>
                       <a:endParaRPr lang="pt-BR" sz="1300" b="0" i="0" u="none" strike="noStrike" dirty="0">
                         <a:solidFill>
@@ -9805,7 +9785,7 @@
           <p:nvPr>
             <p:extLst>
               <p:ext uri="{D42A27DB-BD31-4B8C-83A1-F6EECF244321}">
-                <p14:modId xmlns:p14="http://schemas.microsoft.com/office/powerpoint/2010/main" val="1764523315"/>
+                <p14:modId xmlns:p14="http://schemas.microsoft.com/office/powerpoint/2010/main" val="2030074939"/>
               </p:ext>
             </p:extLst>
           </p:nvPr>
@@ -10190,15 +10170,7 @@
                     <a:lstStyle/>
                     <a:p>
                       <a:pPr algn="ctr" fontAlgn="b"/>
-                      <a:r>
-                        <a:rPr lang="pt-BR" sz="1300" u="none" strike="noStrike">
-                          <a:effectLst/>
-                          <a:latin typeface="Arial" panose="020B0604020202020204" pitchFamily="34" charset="0"/>
-                          <a:cs typeface="Arial" panose="020B0604020202020204" pitchFamily="34" charset="0"/>
-                        </a:rPr>
-                        <a:t>Filtro considerando valores abaixo do limite superior</a:t>
-                      </a:r>
-                      <a:endParaRPr lang="pt-BR" sz="1300" b="0" i="0" u="none" strike="noStrike">
+                      <a:endParaRPr lang="pt-BR" sz="1300" b="0" i="0" u="none" strike="noStrike" dirty="0">
                         <a:solidFill>
                           <a:srgbClr val="000000"/>
                         </a:solidFill>
@@ -10386,14 +10358,6 @@
                     <a:lstStyle/>
                     <a:p>
                       <a:pPr algn="ctr" fontAlgn="b"/>
-                      <a:r>
-                        <a:rPr lang="pt-BR" sz="1300" u="none" strike="noStrike" dirty="0">
-                          <a:effectLst/>
-                          <a:latin typeface="Arial" panose="020B0604020202020204" pitchFamily="34" charset="0"/>
-                          <a:cs typeface="Arial" panose="020B0604020202020204" pitchFamily="34" charset="0"/>
-                        </a:rPr>
-                        <a:t>Filtro considerando valores abaixo do limite superior</a:t>
-                      </a:r>
                       <a:endParaRPr lang="pt-BR" sz="1300" b="0" i="0" u="none" strike="noStrike" dirty="0">
                         <a:solidFill>
                           <a:srgbClr val="000000"/>
@@ -10736,7 +10700,7 @@
             <p:ph idx="1"/>
             <p:extLst>
               <p:ext uri="{D42A27DB-BD31-4B8C-83A1-F6EECF244321}">
-                <p14:modId xmlns:p14="http://schemas.microsoft.com/office/powerpoint/2010/main" val="3289405418"/>
+                <p14:modId xmlns:p14="http://schemas.microsoft.com/office/powerpoint/2010/main" val="1656863850"/>
               </p:ext>
             </p:extLst>
           </p:nvPr>
@@ -10914,12 +10878,12 @@
                     <a:p>
                       <a:pPr algn="ctr" fontAlgn="b"/>
                       <a:r>
-                        <a:rPr lang="pt-BR" sz="1300" u="none" strike="noStrike" dirty="0">
+                        <a:rPr lang="pt-BR" sz="1300" u="none" strike="noStrike" dirty="0" smtClean="0">
                           <a:effectLst/>
                           <a:latin typeface="Arial" panose="020B0604020202020204" pitchFamily="34" charset="0"/>
                           <a:cs typeface="Arial" panose="020B0604020202020204" pitchFamily="34" charset="0"/>
                         </a:rPr>
-                        <a:t>SP</a:t>
+                        <a:t>RJ</a:t>
                       </a:r>
                       <a:endParaRPr lang="pt-BR" sz="1300" b="0" i="0" u="none" strike="noStrike" dirty="0">
                         <a:solidFill>
@@ -10980,12 +10944,12 @@
                     <a:p>
                       <a:pPr algn="ctr" fontAlgn="b"/>
                       <a:r>
-                        <a:rPr lang="pt-BR" sz="1300" u="none" strike="noStrike" dirty="0">
+                        <a:rPr lang="pt-BR" sz="1300" u="none" strike="noStrike" dirty="0" smtClean="0">
                           <a:effectLst/>
                           <a:latin typeface="Arial" panose="020B0604020202020204" pitchFamily="34" charset="0"/>
                           <a:cs typeface="Arial" panose="020B0604020202020204" pitchFamily="34" charset="0"/>
                         </a:rPr>
-                        <a:t>535801</a:t>
+                        <a:t>70898</a:t>
                       </a:r>
                       <a:endParaRPr lang="pt-BR" sz="1300" b="0" i="0" u="none" strike="noStrike" dirty="0">
                         <a:solidFill>
@@ -11053,12 +11017,15 @@
                     <a:p>
                       <a:pPr algn="ctr" fontAlgn="b"/>
                       <a:r>
-                        <a:rPr lang="pt-BR" sz="1300" u="none" strike="noStrike" dirty="0">
+                        <a:rPr lang="pt-BR" sz="1300" b="0" i="0" u="none" strike="noStrike" dirty="0" smtClean="0">
+                          <a:solidFill>
+                            <a:schemeClr val="dk1"/>
+                          </a:solidFill>
                           <a:effectLst/>
                           <a:latin typeface="Arial" panose="020B0604020202020204" pitchFamily="34" charset="0"/>
                           <a:cs typeface="Arial" panose="020B0604020202020204" pitchFamily="34" charset="0"/>
                         </a:rPr>
-                        <a:t>MG</a:t>
+                        <a:t>SP</a:t>
                       </a:r>
                       <a:endParaRPr lang="pt-BR" sz="1300" b="0" i="0" u="none" strike="noStrike" dirty="0">
                         <a:solidFill>
@@ -11119,12 +11086,12 @@
                     <a:p>
                       <a:pPr algn="ctr" fontAlgn="b"/>
                       <a:r>
-                        <a:rPr lang="pt-BR" sz="1300" u="none" strike="noStrike" dirty="0">
+                        <a:rPr lang="pt-BR" sz="1300" u="none" strike="noStrike" dirty="0" smtClean="0">
                           <a:effectLst/>
                           <a:latin typeface="Arial" panose="020B0604020202020204" pitchFamily="34" charset="0"/>
                           <a:cs typeface="Arial" panose="020B0604020202020204" pitchFamily="34" charset="0"/>
                         </a:rPr>
-                        <a:t>373734</a:t>
+                        <a:t>27470</a:t>
                       </a:r>
                       <a:endParaRPr lang="pt-BR" sz="1300" b="0" i="0" u="none" strike="noStrike" dirty="0">
                         <a:solidFill>
@@ -11192,12 +11159,15 @@
                     <a:p>
                       <a:pPr algn="ctr" fontAlgn="b"/>
                       <a:r>
-                        <a:rPr lang="pt-BR" sz="1300" u="none" strike="noStrike" dirty="0">
+                        <a:rPr lang="pt-BR" sz="1300" b="0" i="0" u="none" strike="noStrike" dirty="0" smtClean="0">
+                          <a:solidFill>
+                            <a:schemeClr val="dk1"/>
+                          </a:solidFill>
                           <a:effectLst/>
                           <a:latin typeface="Arial" panose="020B0604020202020204" pitchFamily="34" charset="0"/>
                           <a:cs typeface="Arial" panose="020B0604020202020204" pitchFamily="34" charset="0"/>
                         </a:rPr>
-                        <a:t>RS</a:t>
+                        <a:t>SC</a:t>
                       </a:r>
                       <a:endParaRPr lang="pt-BR" sz="1300" b="0" i="0" u="none" strike="noStrike" dirty="0">
                         <a:solidFill>
@@ -11258,12 +11228,12 @@
                     <a:p>
                       <a:pPr algn="ctr" fontAlgn="b"/>
                       <a:r>
-                        <a:rPr lang="pt-BR" sz="1300" u="none" strike="noStrike" dirty="0">
+                        <a:rPr lang="pt-BR" sz="1300" u="none" strike="noStrike" dirty="0" smtClean="0">
                           <a:effectLst/>
                           <a:latin typeface="Arial" panose="020B0604020202020204" pitchFamily="34" charset="0"/>
                           <a:cs typeface="Arial" panose="020B0604020202020204" pitchFamily="34" charset="0"/>
                         </a:rPr>
-                        <a:t>221774</a:t>
+                        <a:t>15448</a:t>
                       </a:r>
                       <a:endParaRPr lang="pt-BR" sz="1300" b="0" i="0" u="none" strike="noStrike" dirty="0">
                         <a:solidFill>
@@ -11331,12 +11301,12 @@
                     <a:p>
                       <a:pPr algn="ctr" fontAlgn="b"/>
                       <a:r>
-                        <a:rPr lang="pt-BR" sz="1300" u="none" strike="noStrike" dirty="0">
+                        <a:rPr lang="pt-BR" sz="1300" u="none" strike="noStrike" dirty="0" smtClean="0">
                           <a:effectLst/>
                           <a:latin typeface="Arial" panose="020B0604020202020204" pitchFamily="34" charset="0"/>
                           <a:cs typeface="Arial" panose="020B0604020202020204" pitchFamily="34" charset="0"/>
                         </a:rPr>
-                        <a:t>PR</a:t>
+                        <a:t>PA</a:t>
                       </a:r>
                       <a:endParaRPr lang="pt-BR" sz="1300" b="0" i="0" u="none" strike="noStrike" dirty="0">
                         <a:solidFill>
@@ -11397,12 +11367,12 @@
                     <a:p>
                       <a:pPr algn="ctr" fontAlgn="b"/>
                       <a:r>
-                        <a:rPr lang="pt-BR" sz="1300" u="none" strike="noStrike" dirty="0">
+                        <a:rPr lang="pt-BR" sz="1300" u="none" strike="noStrike" dirty="0" smtClean="0">
                           <a:effectLst/>
                           <a:latin typeface="Arial" panose="020B0604020202020204" pitchFamily="34" charset="0"/>
                           <a:cs typeface="Arial" panose="020B0604020202020204" pitchFamily="34" charset="0"/>
                         </a:rPr>
-                        <a:t>207827</a:t>
+                        <a:t>14975</a:t>
                       </a:r>
                       <a:endParaRPr lang="pt-BR" sz="1300" b="0" i="0" u="none" strike="noStrike" dirty="0">
                         <a:solidFill>
@@ -11470,14 +11440,17 @@
                     <a:p>
                       <a:pPr algn="ctr" fontAlgn="b"/>
                       <a:r>
-                        <a:rPr lang="pt-BR" sz="1300" u="none" strike="noStrike">
+                        <a:rPr lang="pt-BR" sz="1300" b="0" i="0" u="none" strike="noStrike" dirty="0" smtClean="0">
+                          <a:solidFill>
+                            <a:schemeClr val="dk1"/>
+                          </a:solidFill>
                           <a:effectLst/>
                           <a:latin typeface="Arial" panose="020B0604020202020204" pitchFamily="34" charset="0"/>
                           <a:cs typeface="Arial" panose="020B0604020202020204" pitchFamily="34" charset="0"/>
                         </a:rPr>
-                        <a:t>RJ</a:t>
+                        <a:t>PR</a:t>
                       </a:r>
-                      <a:endParaRPr lang="pt-BR" sz="1300" b="0" i="0" u="none" strike="noStrike">
+                      <a:endParaRPr lang="pt-BR" sz="1300" b="0" i="0" u="none" strike="noStrike" dirty="0">
                         <a:solidFill>
                           <a:srgbClr val="000000"/>
                         </a:solidFill>
@@ -11536,12 +11509,12 @@
                     <a:p>
                       <a:pPr algn="ctr" fontAlgn="b"/>
                       <a:r>
-                        <a:rPr lang="pt-BR" sz="1300" u="none" strike="noStrike" dirty="0">
+                        <a:rPr lang="pt-BR" sz="1300" u="none" strike="noStrike" dirty="0" smtClean="0">
                           <a:effectLst/>
                           <a:latin typeface="Arial" panose="020B0604020202020204" pitchFamily="34" charset="0"/>
                           <a:cs typeface="Arial" panose="020B0604020202020204" pitchFamily="34" charset="0"/>
                         </a:rPr>
-                        <a:t>168040</a:t>
+                        <a:t>14291</a:t>
                       </a:r>
                       <a:endParaRPr lang="pt-BR" sz="1300" b="0" i="0" u="none" strike="noStrike" dirty="0">
                         <a:solidFill>
@@ -11609,12 +11582,15 @@
                     <a:p>
                       <a:pPr algn="ctr" fontAlgn="b"/>
                       <a:r>
-                        <a:rPr lang="pt-BR" sz="1300" u="none" strike="noStrike" dirty="0">
+                        <a:rPr lang="pt-BR" sz="1300" b="0" i="0" u="none" strike="noStrike" dirty="0" smtClean="0">
+                          <a:solidFill>
+                            <a:schemeClr val="dk1"/>
+                          </a:solidFill>
                           <a:effectLst/>
                           <a:latin typeface="Arial" panose="020B0604020202020204" pitchFamily="34" charset="0"/>
                           <a:cs typeface="Arial" panose="020B0604020202020204" pitchFamily="34" charset="0"/>
                         </a:rPr>
-                        <a:t>GO</a:t>
+                        <a:t>MG</a:t>
                       </a:r>
                       <a:endParaRPr lang="pt-BR" sz="1300" b="0" i="0" u="none" strike="noStrike" dirty="0">
                         <a:solidFill>
@@ -11675,12 +11651,12 @@
                     <a:p>
                       <a:pPr algn="ctr" fontAlgn="b"/>
                       <a:r>
-                        <a:rPr lang="pt-BR" sz="1300" u="none" strike="noStrike" dirty="0">
+                        <a:rPr lang="pt-BR" sz="1300" u="none" strike="noStrike" dirty="0" smtClean="0">
                           <a:effectLst/>
                           <a:latin typeface="Arial" panose="020B0604020202020204" pitchFamily="34" charset="0"/>
                           <a:cs typeface="Arial" panose="020B0604020202020204" pitchFamily="34" charset="0"/>
                         </a:rPr>
-                        <a:t>133498</a:t>
+                        <a:t>11305</a:t>
                       </a:r>
                       <a:endParaRPr lang="pt-BR" sz="1300" b="0" i="0" u="none" strike="noStrike" dirty="0">
                         <a:solidFill>
@@ -11748,14 +11724,17 @@
                     <a:p>
                       <a:pPr algn="ctr" fontAlgn="b"/>
                       <a:r>
-                        <a:rPr lang="pt-BR" sz="1300" u="none" strike="noStrike">
+                        <a:rPr lang="pt-BR" sz="1300" b="0" i="0" u="none" strike="noStrike" dirty="0" smtClean="0">
+                          <a:solidFill>
+                            <a:schemeClr val="dk1"/>
+                          </a:solidFill>
                           <a:effectLst/>
                           <a:latin typeface="Arial" panose="020B0604020202020204" pitchFamily="34" charset="0"/>
                           <a:cs typeface="Arial" panose="020B0604020202020204" pitchFamily="34" charset="0"/>
                         </a:rPr>
-                        <a:t>BA</a:t>
+                        <a:t>PB</a:t>
                       </a:r>
-                      <a:endParaRPr lang="pt-BR" sz="1300" b="0" i="0" u="none" strike="noStrike">
+                      <a:endParaRPr lang="pt-BR" sz="1300" b="0" i="0" u="none" strike="noStrike" dirty="0">
                         <a:solidFill>
                           <a:srgbClr val="000000"/>
                         </a:solidFill>
@@ -11814,12 +11793,12 @@
                     <a:p>
                       <a:pPr algn="ctr" fontAlgn="b"/>
                       <a:r>
-                        <a:rPr lang="pt-BR" sz="1300" u="none" strike="noStrike" dirty="0">
+                        <a:rPr lang="pt-BR" sz="1300" u="none" strike="noStrike" dirty="0" smtClean="0">
                           <a:effectLst/>
                           <a:latin typeface="Arial" panose="020B0604020202020204" pitchFamily="34" charset="0"/>
                           <a:cs typeface="Arial" panose="020B0604020202020204" pitchFamily="34" charset="0"/>
                         </a:rPr>
-                        <a:t>126284</a:t>
+                        <a:t>10577</a:t>
                       </a:r>
                       <a:endParaRPr lang="pt-BR" sz="1300" b="0" i="0" u="none" strike="noStrike" dirty="0">
                         <a:solidFill>
@@ -11887,14 +11866,17 @@
                     <a:p>
                       <a:pPr algn="ctr" fontAlgn="b"/>
                       <a:r>
-                        <a:rPr lang="pt-BR" sz="1300" u="none" strike="noStrike">
+                        <a:rPr lang="pt-BR" sz="1300" b="0" i="0" u="none" strike="noStrike" dirty="0" smtClean="0">
+                          <a:solidFill>
+                            <a:schemeClr val="dk1"/>
+                          </a:solidFill>
                           <a:effectLst/>
                           <a:latin typeface="Arial" panose="020B0604020202020204" pitchFamily="34" charset="0"/>
                           <a:cs typeface="Arial" panose="020B0604020202020204" pitchFamily="34" charset="0"/>
                         </a:rPr>
-                        <a:t>SC</a:t>
+                        <a:t>ES</a:t>
                       </a:r>
-                      <a:endParaRPr lang="pt-BR" sz="1300" b="0" i="0" u="none" strike="noStrike">
+                      <a:endParaRPr lang="pt-BR" sz="1300" b="0" i="0" u="none" strike="noStrike" dirty="0">
                         <a:solidFill>
                           <a:srgbClr val="000000"/>
                         </a:solidFill>
@@ -11953,12 +11935,12 @@
                     <a:p>
                       <a:pPr algn="ctr" fontAlgn="b"/>
                       <a:r>
-                        <a:rPr lang="pt-BR" sz="1300" u="none" strike="noStrike" dirty="0">
+                        <a:rPr lang="pt-BR" sz="1300" u="none" strike="noStrike" dirty="0" smtClean="0">
                           <a:effectLst/>
                           <a:latin typeface="Arial" panose="020B0604020202020204" pitchFamily="34" charset="0"/>
                           <a:cs typeface="Arial" panose="020B0604020202020204" pitchFamily="34" charset="0"/>
                         </a:rPr>
-                        <a:t>120303</a:t>
+                        <a:t>9741</a:t>
                       </a:r>
                       <a:endParaRPr lang="pt-BR" sz="1300" b="0" i="0" u="none" strike="noStrike" dirty="0">
                         <a:solidFill>
@@ -12026,14 +12008,17 @@
                     <a:p>
                       <a:pPr algn="ctr" fontAlgn="b"/>
                       <a:r>
-                        <a:rPr lang="pt-BR" sz="1300" u="none" strike="noStrike">
+                        <a:rPr lang="pt-BR" sz="1300" b="0" i="0" u="none" strike="noStrike" dirty="0" smtClean="0">
+                          <a:solidFill>
+                            <a:schemeClr val="dk1"/>
+                          </a:solidFill>
                           <a:effectLst/>
                           <a:latin typeface="Arial" panose="020B0604020202020204" pitchFamily="34" charset="0"/>
                           <a:cs typeface="Arial" panose="020B0604020202020204" pitchFamily="34" charset="0"/>
                         </a:rPr>
-                        <a:t>PE</a:t>
+                        <a:t>RN</a:t>
                       </a:r>
-                      <a:endParaRPr lang="pt-BR" sz="1300" b="0" i="0" u="none" strike="noStrike">
+                      <a:endParaRPr lang="pt-BR" sz="1300" b="0" i="0" u="none" strike="noStrike" dirty="0">
                         <a:solidFill>
                           <a:srgbClr val="000000"/>
                         </a:solidFill>
@@ -12092,12 +12077,12 @@
                     <a:p>
                       <a:pPr algn="ctr" fontAlgn="b"/>
                       <a:r>
-                        <a:rPr lang="pt-BR" sz="1300" u="none" strike="noStrike" dirty="0">
+                        <a:rPr lang="pt-BR" sz="1300" u="none" strike="noStrike" dirty="0" smtClean="0">
                           <a:effectLst/>
                           <a:latin typeface="Arial" panose="020B0604020202020204" pitchFamily="34" charset="0"/>
                           <a:cs typeface="Arial" panose="020B0604020202020204" pitchFamily="34" charset="0"/>
                         </a:rPr>
-                        <a:t>79220</a:t>
+                        <a:t>7572</a:t>
                       </a:r>
                       <a:endParaRPr lang="pt-BR" sz="1300" b="0" i="0" u="none" strike="noStrike" dirty="0">
                         <a:solidFill>
@@ -12165,14 +12150,17 @@
                     <a:p>
                       <a:pPr algn="ctr" fontAlgn="b"/>
                       <a:r>
-                        <a:rPr lang="pt-BR" sz="1300" u="none" strike="noStrike">
+                        <a:rPr lang="pt-BR" sz="1300" b="0" i="0" u="none" strike="noStrike" dirty="0" smtClean="0">
+                          <a:solidFill>
+                            <a:schemeClr val="dk1"/>
+                          </a:solidFill>
                           <a:effectLst/>
                           <a:latin typeface="Arial" panose="020B0604020202020204" pitchFamily="34" charset="0"/>
                           <a:cs typeface="Arial" panose="020B0604020202020204" pitchFamily="34" charset="0"/>
                         </a:rPr>
-                        <a:t>PB</a:t>
+                        <a:t>MT</a:t>
                       </a:r>
-                      <a:endParaRPr lang="pt-BR" sz="1300" b="0" i="0" u="none" strike="noStrike">
+                      <a:endParaRPr lang="pt-BR" sz="1300" b="0" i="0" u="none" strike="noStrike" dirty="0">
                         <a:solidFill>
                           <a:srgbClr val="000000"/>
                         </a:solidFill>
@@ -12231,12 +12219,12 @@
                     <a:p>
                       <a:pPr algn="ctr" fontAlgn="b"/>
                       <a:r>
-                        <a:rPr lang="pt-BR" sz="1300" u="none" strike="noStrike" dirty="0">
+                        <a:rPr lang="pt-BR" sz="1300" u="none" strike="noStrike" dirty="0" smtClean="0">
                           <a:effectLst/>
                           <a:latin typeface="Arial" panose="020B0604020202020204" pitchFamily="34" charset="0"/>
                           <a:cs typeface="Arial" panose="020B0604020202020204" pitchFamily="34" charset="0"/>
                         </a:rPr>
-                        <a:t>59447</a:t>
+                        <a:t>6586</a:t>
                       </a:r>
                       <a:endParaRPr lang="pt-BR" sz="1300" b="0" i="0" u="none" strike="noStrike" dirty="0">
                         <a:solidFill>
@@ -12302,7 +12290,7 @@
       </p:graphicFrame>
       <p:pic>
         <p:nvPicPr>
-          <p:cNvPr id="7" name="Imagem 6"/>
+          <p:cNvPr id="6" name="Imagem 5"/>
           <p:cNvPicPr>
             <a:picLocks noChangeAspect="1"/>
           </p:cNvPicPr>
@@ -12316,8 +12304,8 @@
         </p:blipFill>
         <p:spPr>
           <a:xfrm>
-            <a:off x="4051300" y="2192337"/>
-            <a:ext cx="7203788" cy="4297507"/>
+            <a:off x="4180114" y="2195065"/>
+            <a:ext cx="6729004" cy="4294779"/>
           </a:xfrm>
           <a:prstGeom prst="rect">
             <a:avLst/>
@@ -12394,7 +12382,7 @@
       </p:sp>
       <p:pic>
         <p:nvPicPr>
-          <p:cNvPr id="8" name="Imagem 7"/>
+          <p:cNvPr id="3" name="Imagem 2"/>
           <p:cNvPicPr>
             <a:picLocks noChangeAspect="1"/>
           </p:cNvPicPr>
@@ -12408,8 +12396,8 @@
         </p:blipFill>
         <p:spPr>
           <a:xfrm>
-            <a:off x="6342061" y="1853247"/>
-            <a:ext cx="5400676" cy="4333875"/>
+            <a:off x="306477" y="1853245"/>
+            <a:ext cx="5637873" cy="4333875"/>
           </a:xfrm>
           <a:prstGeom prst="rect">
             <a:avLst/>
@@ -12418,7 +12406,7 @@
       </p:pic>
       <p:pic>
         <p:nvPicPr>
-          <p:cNvPr id="9" name="Imagem 8"/>
+          <p:cNvPr id="4" name="Imagem 3"/>
           <p:cNvPicPr>
             <a:picLocks noChangeAspect="1"/>
           </p:cNvPicPr>
@@ -12432,80 +12420,14 @@
         </p:blipFill>
         <p:spPr>
           <a:xfrm>
-            <a:off x="403225" y="1853247"/>
-            <a:ext cx="5695950" cy="4333875"/>
+            <a:off x="6153355" y="1853245"/>
+            <a:ext cx="5731065" cy="4333875"/>
           </a:xfrm>
           <a:prstGeom prst="rect">
             <a:avLst/>
           </a:prstGeom>
         </p:spPr>
       </p:pic>
-      <p:sp>
-        <p:nvSpPr>
-          <p:cNvPr id="10" name="CaixaDeTexto 9"/>
-          <p:cNvSpPr txBox="1"/>
-          <p:nvPr/>
-        </p:nvSpPr>
-        <p:spPr>
-          <a:xfrm>
-            <a:off x="7023100" y="2768600"/>
-            <a:ext cx="711200" cy="276999"/>
-          </a:xfrm>
-          <a:prstGeom prst="rect">
-            <a:avLst/>
-          </a:prstGeom>
-          <a:noFill/>
-        </p:spPr>
-        <p:txBody>
-          <a:bodyPr wrap="square" rtlCol="0">
-            <a:spAutoFit/>
-          </a:bodyPr>
-          <a:lstStyle/>
-          <a:p>
-            <a:r>
-              <a:rPr lang="pt-BR" sz="1200" dirty="0">
-                <a:solidFill>
-                  <a:schemeClr val="bg1"/>
-                </a:solidFill>
-              </a:rPr>
-              <a:t>780753</a:t>
-            </a:r>
-          </a:p>
-        </p:txBody>
-      </p:sp>
-      <p:sp>
-        <p:nvSpPr>
-          <p:cNvPr id="11" name="CaixaDeTexto 10"/>
-          <p:cNvSpPr txBox="1"/>
-          <p:nvPr/>
-        </p:nvSpPr>
-        <p:spPr>
-          <a:xfrm>
-            <a:off x="10883900" y="2095500"/>
-            <a:ext cx="711200" cy="276999"/>
-          </a:xfrm>
-          <a:prstGeom prst="rect">
-            <a:avLst/>
-          </a:prstGeom>
-          <a:noFill/>
-        </p:spPr>
-        <p:txBody>
-          <a:bodyPr wrap="square" rtlCol="0">
-            <a:spAutoFit/>
-          </a:bodyPr>
-          <a:lstStyle/>
-          <a:p>
-            <a:r>
-              <a:rPr lang="pt-BR" sz="1200" dirty="0">
-                <a:solidFill>
-                  <a:schemeClr val="bg1"/>
-                </a:solidFill>
-              </a:rPr>
-              <a:t>969984</a:t>
-            </a:r>
-          </a:p>
-        </p:txBody>
-      </p:sp>
     </p:spTree>
     <p:extLst>
       <p:ext uri="{BB962C8B-B14F-4D97-AF65-F5344CB8AC3E}">
@@ -12918,8 +12840,9 @@
             </a:pPr>
             <a:r>
               <a:rPr lang="pt-BR" dirty="0" smtClean="0"/>
-              <a:t>São Paulo</a:t>
-            </a:r>
+              <a:t>Rio de Janeiro</a:t>
+            </a:r>
+            <a:endParaRPr lang="pt-BR" dirty="0" smtClean="0"/>
           </a:p>
           <a:p>
             <a:pPr marL="800100" lvl="1" indent="-342900">
@@ -12928,8 +12851,9 @@
             </a:pPr>
             <a:r>
               <a:rPr lang="pt-BR" dirty="0" smtClean="0"/>
-              <a:t>Minas Gerais</a:t>
-            </a:r>
+              <a:t>São Paulo</a:t>
+            </a:r>
+            <a:endParaRPr lang="pt-BR" dirty="0" smtClean="0"/>
           </a:p>
           <a:p>
             <a:pPr marL="800100" lvl="1" indent="-342900">
@@ -12938,8 +12862,9 @@
             </a:pPr>
             <a:r>
               <a:rPr lang="pt-BR" dirty="0" smtClean="0"/>
-              <a:t>Rio Grande do Sul</a:t>
-            </a:r>
+              <a:t>Santa Catarina</a:t>
+            </a:r>
+            <a:endParaRPr lang="pt-BR" dirty="0" smtClean="0"/>
           </a:p>
           <a:p>
             <a:pPr lvl="1"/>

</xml_diff>